<commit_message>
Added one slide in the PowerPoint file. Not finished yet.
</commit_message>
<xml_diff>
--- a/Farida_Stocks_Presentation/Stock_Presentation_Farida_v1.pptx
+++ b/Farida_Stocks_Presentation/Stock_Presentation_Farida_v1.pptx
@@ -8,8 +8,8 @@
     <p:sldId id="256" r:id="rId2"/>
     <p:sldId id="258" r:id="rId3"/>
     <p:sldId id="259" r:id="rId4"/>
-    <p:sldId id="260" r:id="rId5"/>
-    <p:sldId id="264" r:id="rId6"/>
+    <p:sldId id="264" r:id="rId5"/>
+    <p:sldId id="265" r:id="rId6"/>
   </p:sldIdLst>
   <p:sldSz cx="12192000" cy="6858000"/>
   <p:notesSz cx="6858000" cy="9144000"/>
@@ -3899,7 +3899,7 @@
         <p:spPr>
           <a:xfrm>
             <a:off x="1988288" y="324439"/>
-            <a:ext cx="2721936" cy="643124"/>
+            <a:ext cx="3912782" cy="643124"/>
           </a:xfrm>
         </p:spPr>
         <p:txBody>
@@ -3913,217 +3913,164 @@
                 <a:latin typeface="Arial" panose="020B0604020202020204" pitchFamily="34" charset="0"/>
                 <a:cs typeface="Arial" panose="020B0604020202020204" pitchFamily="34" charset="0"/>
               </a:rPr>
-              <a:t>What is PCA?</a:t>
-            </a:r>
-          </a:p>
-        </p:txBody>
-      </p:sp>
-      <p:sp>
-        <p:nvSpPr>
-          <p:cNvPr id="7" name="Text Placeholder 4">
-            <a:extLst>
-              <a:ext uri="{FF2B5EF4-FFF2-40B4-BE49-F238E27FC236}">
-                <a16:creationId xmlns:a16="http://schemas.microsoft.com/office/drawing/2014/main" id="{B03C5A17-7C87-4103-AC51-270BF835D587}"/>
-              </a:ext>
-            </a:extLst>
-          </p:cNvPr>
-          <p:cNvSpPr txBox="1">
-            <a:spLocks/>
-          </p:cNvSpPr>
+              <a:t>Results: All stocks</a:t>
+            </a:r>
+          </a:p>
+        </p:txBody>
+      </p:sp>
+      <p:pic>
+        <p:nvPicPr>
+          <p:cNvPr id="3" name="Picture 2">
+            <a:extLst>
+              <a:ext uri="{FF2B5EF4-FFF2-40B4-BE49-F238E27FC236}">
+                <a16:creationId xmlns:a16="http://schemas.microsoft.com/office/drawing/2014/main" id="{0CAF7B1F-5D0F-49D6-A32D-14E75202F263}"/>
+              </a:ext>
+            </a:extLst>
+          </p:cNvPr>
+          <p:cNvPicPr>
+            <a:picLocks noChangeAspect="1"/>
+          </p:cNvPicPr>
           <p:nvPr/>
-        </p:nvSpPr>
+        </p:nvPicPr>
+        <p:blipFill>
+          <a:blip r:embed="rId2"/>
+          <a:stretch>
+            <a:fillRect/>
+          </a:stretch>
+        </p:blipFill>
         <p:spPr>
           <a:xfrm>
-            <a:off x="1864240" y="882502"/>
-            <a:ext cx="3483935" cy="643124"/>
+            <a:off x="8934894" y="324439"/>
+            <a:ext cx="2824716" cy="1557321"/>
           </a:xfrm>
           <a:prstGeom prst="rect">
             <a:avLst/>
           </a:prstGeom>
         </p:spPr>
-        <p:txBody>
-          <a:bodyPr vert="horz" lIns="91440" tIns="45720" rIns="91440" bIns="45720" rtlCol="0" anchor="b">
-            <a:normAutofit/>
-          </a:bodyPr>
-          <a:lstStyle>
-            <a:lvl1pPr marL="0" indent="0" algn="l" defTabSz="914400" rtl="0" eaLnBrk="1" latinLnBrk="0" hangingPunct="1">
-              <a:lnSpc>
-                <a:spcPct val="90000"/>
-              </a:lnSpc>
-              <a:spcBef>
-                <a:spcPts val="1000"/>
-              </a:spcBef>
-              <a:buFont typeface="Arial" panose="020B0604020202020204" pitchFamily="34" charset="0"/>
-              <a:buNone/>
-              <a:defRPr sz="2400" b="1" kern="1200">
-                <a:solidFill>
-                  <a:schemeClr val="tx1"/>
-                </a:solidFill>
-                <a:latin typeface="+mn-lt"/>
-                <a:ea typeface="+mn-ea"/>
-                <a:cs typeface="+mn-cs"/>
-              </a:defRPr>
-            </a:lvl1pPr>
-            <a:lvl2pPr marL="457200" indent="0" algn="l" defTabSz="914400" rtl="0" eaLnBrk="1" latinLnBrk="0" hangingPunct="1">
-              <a:lnSpc>
-                <a:spcPct val="90000"/>
-              </a:lnSpc>
-              <a:spcBef>
-                <a:spcPts val="500"/>
-              </a:spcBef>
-              <a:buFont typeface="Arial" panose="020B0604020202020204" pitchFamily="34" charset="0"/>
-              <a:buNone/>
-              <a:defRPr sz="2000" b="1" kern="1200">
-                <a:solidFill>
-                  <a:schemeClr val="tx1"/>
-                </a:solidFill>
-                <a:latin typeface="+mn-lt"/>
-                <a:ea typeface="+mn-ea"/>
-                <a:cs typeface="+mn-cs"/>
-              </a:defRPr>
-            </a:lvl2pPr>
-            <a:lvl3pPr marL="914400" indent="0" algn="l" defTabSz="914400" rtl="0" eaLnBrk="1" latinLnBrk="0" hangingPunct="1">
-              <a:lnSpc>
-                <a:spcPct val="90000"/>
-              </a:lnSpc>
-              <a:spcBef>
-                <a:spcPts val="500"/>
-              </a:spcBef>
-              <a:buFont typeface="Arial" panose="020B0604020202020204" pitchFamily="34" charset="0"/>
-              <a:buNone/>
-              <a:defRPr sz="1800" b="1" kern="1200">
-                <a:solidFill>
-                  <a:schemeClr val="tx1"/>
-                </a:solidFill>
-                <a:latin typeface="+mn-lt"/>
-                <a:ea typeface="+mn-ea"/>
-                <a:cs typeface="+mn-cs"/>
-              </a:defRPr>
-            </a:lvl3pPr>
-            <a:lvl4pPr marL="1371600" indent="0" algn="l" defTabSz="914400" rtl="0" eaLnBrk="1" latinLnBrk="0" hangingPunct="1">
-              <a:lnSpc>
-                <a:spcPct val="90000"/>
-              </a:lnSpc>
-              <a:spcBef>
-                <a:spcPts val="500"/>
-              </a:spcBef>
-              <a:buFont typeface="Arial" panose="020B0604020202020204" pitchFamily="34" charset="0"/>
-              <a:buNone/>
-              <a:defRPr sz="1600" b="1" kern="1200">
-                <a:solidFill>
-                  <a:schemeClr val="tx1"/>
-                </a:solidFill>
-                <a:latin typeface="+mn-lt"/>
-                <a:ea typeface="+mn-ea"/>
-                <a:cs typeface="+mn-cs"/>
-              </a:defRPr>
-            </a:lvl4pPr>
-            <a:lvl5pPr marL="1828800" indent="0" algn="l" defTabSz="914400" rtl="0" eaLnBrk="1" latinLnBrk="0" hangingPunct="1">
-              <a:lnSpc>
-                <a:spcPct val="90000"/>
-              </a:lnSpc>
-              <a:spcBef>
-                <a:spcPts val="500"/>
-              </a:spcBef>
-              <a:buFont typeface="Arial" panose="020B0604020202020204" pitchFamily="34" charset="0"/>
-              <a:buNone/>
-              <a:defRPr sz="1600" b="1" kern="1200">
-                <a:solidFill>
-                  <a:schemeClr val="tx1"/>
-                </a:solidFill>
-                <a:latin typeface="+mn-lt"/>
-                <a:ea typeface="+mn-ea"/>
-                <a:cs typeface="+mn-cs"/>
-              </a:defRPr>
-            </a:lvl5pPr>
-            <a:lvl6pPr marL="2286000" indent="0" algn="l" defTabSz="914400" rtl="0" eaLnBrk="1" latinLnBrk="0" hangingPunct="1">
-              <a:lnSpc>
-                <a:spcPct val="90000"/>
-              </a:lnSpc>
-              <a:spcBef>
-                <a:spcPts val="500"/>
-              </a:spcBef>
-              <a:buFont typeface="Arial" panose="020B0604020202020204" pitchFamily="34" charset="0"/>
-              <a:buNone/>
-              <a:defRPr sz="1600" b="1" kern="1200">
-                <a:solidFill>
-                  <a:schemeClr val="tx1"/>
-                </a:solidFill>
-                <a:latin typeface="+mn-lt"/>
-                <a:ea typeface="+mn-ea"/>
-                <a:cs typeface="+mn-cs"/>
-              </a:defRPr>
-            </a:lvl6pPr>
-            <a:lvl7pPr marL="2743200" indent="0" algn="l" defTabSz="914400" rtl="0" eaLnBrk="1" latinLnBrk="0" hangingPunct="1">
-              <a:lnSpc>
-                <a:spcPct val="90000"/>
-              </a:lnSpc>
-              <a:spcBef>
-                <a:spcPts val="500"/>
-              </a:spcBef>
-              <a:buFont typeface="Arial" panose="020B0604020202020204" pitchFamily="34" charset="0"/>
-              <a:buNone/>
-              <a:defRPr sz="1600" b="1" kern="1200">
-                <a:solidFill>
-                  <a:schemeClr val="tx1"/>
-                </a:solidFill>
-                <a:latin typeface="+mn-lt"/>
-                <a:ea typeface="+mn-ea"/>
-                <a:cs typeface="+mn-cs"/>
-              </a:defRPr>
-            </a:lvl7pPr>
-            <a:lvl8pPr marL="3200400" indent="0" algn="l" defTabSz="914400" rtl="0" eaLnBrk="1" latinLnBrk="0" hangingPunct="1">
-              <a:lnSpc>
-                <a:spcPct val="90000"/>
-              </a:lnSpc>
-              <a:spcBef>
-                <a:spcPts val="500"/>
-              </a:spcBef>
-              <a:buFont typeface="Arial" panose="020B0604020202020204" pitchFamily="34" charset="0"/>
-              <a:buNone/>
-              <a:defRPr sz="1600" b="1" kern="1200">
-                <a:solidFill>
-                  <a:schemeClr val="tx1"/>
-                </a:solidFill>
-                <a:latin typeface="+mn-lt"/>
-                <a:ea typeface="+mn-ea"/>
-                <a:cs typeface="+mn-cs"/>
-              </a:defRPr>
-            </a:lvl8pPr>
-            <a:lvl9pPr marL="3657600" indent="0" algn="l" defTabSz="914400" rtl="0" eaLnBrk="1" latinLnBrk="0" hangingPunct="1">
-              <a:lnSpc>
-                <a:spcPct val="90000"/>
-              </a:lnSpc>
-              <a:spcBef>
-                <a:spcPts val="500"/>
-              </a:spcBef>
-              <a:buFont typeface="Arial" panose="020B0604020202020204" pitchFamily="34" charset="0"/>
-              <a:buNone/>
-              <a:defRPr sz="1600" b="1" kern="1200">
-                <a:solidFill>
-                  <a:schemeClr val="tx1"/>
-                </a:solidFill>
-                <a:latin typeface="+mn-lt"/>
-                <a:ea typeface="+mn-ea"/>
-                <a:cs typeface="+mn-cs"/>
-              </a:defRPr>
-            </a:lvl9pPr>
-          </a:lstStyle>
-          <a:p>
-            <a:r>
-              <a:rPr lang="en-US" sz="2800" dirty="0">
-                <a:latin typeface="Arial" panose="020B0604020202020204" pitchFamily="34" charset="0"/>
-                <a:cs typeface="Arial" panose="020B0604020202020204" pitchFamily="34" charset="0"/>
-              </a:rPr>
-              <a:t>What is K-Means?</a:t>
-            </a:r>
-          </a:p>
-        </p:txBody>
-      </p:sp>
+      </p:pic>
+      <p:pic>
+        <p:nvPicPr>
+          <p:cNvPr id="6" name="Picture 5">
+            <a:extLst>
+              <a:ext uri="{FF2B5EF4-FFF2-40B4-BE49-F238E27FC236}">
+                <a16:creationId xmlns:a16="http://schemas.microsoft.com/office/drawing/2014/main" id="{4C81E6F6-744D-4017-B411-4B7EB5B5D00E}"/>
+              </a:ext>
+            </a:extLst>
+          </p:cNvPr>
+          <p:cNvPicPr>
+            <a:picLocks noChangeAspect="1"/>
+          </p:cNvPicPr>
+          <p:nvPr/>
+        </p:nvPicPr>
+        <p:blipFill>
+          <a:blip r:embed="rId3"/>
+          <a:stretch>
+            <a:fillRect/>
+          </a:stretch>
+        </p:blipFill>
+        <p:spPr>
+          <a:xfrm>
+            <a:off x="432390" y="967563"/>
+            <a:ext cx="4570671" cy="2097301"/>
+          </a:xfrm>
+          <a:prstGeom prst="rect">
+            <a:avLst/>
+          </a:prstGeom>
+        </p:spPr>
+      </p:pic>
+      <p:pic>
+        <p:nvPicPr>
+          <p:cNvPr id="11" name="Picture 10">
+            <a:extLst>
+              <a:ext uri="{FF2B5EF4-FFF2-40B4-BE49-F238E27FC236}">
+                <a16:creationId xmlns:a16="http://schemas.microsoft.com/office/drawing/2014/main" id="{5987EBEC-FB14-4756-99AE-281559BE49D4}"/>
+              </a:ext>
+            </a:extLst>
+          </p:cNvPr>
+          <p:cNvPicPr>
+            <a:picLocks noChangeAspect="1"/>
+          </p:cNvPicPr>
+          <p:nvPr/>
+        </p:nvPicPr>
+        <p:blipFill rotWithShape="1">
+          <a:blip r:embed="rId4"/>
+          <a:srcRect r="2340"/>
+          <a:stretch/>
+        </p:blipFill>
+        <p:spPr>
+          <a:xfrm>
+            <a:off x="310923" y="3435288"/>
+            <a:ext cx="5154212" cy="3098273"/>
+          </a:xfrm>
+          <a:prstGeom prst="rect">
+            <a:avLst/>
+          </a:prstGeom>
+        </p:spPr>
+      </p:pic>
+      <p:pic>
+        <p:nvPicPr>
+          <p:cNvPr id="13" name="Picture 12">
+            <a:extLst>
+              <a:ext uri="{FF2B5EF4-FFF2-40B4-BE49-F238E27FC236}">
+                <a16:creationId xmlns:a16="http://schemas.microsoft.com/office/drawing/2014/main" id="{C5696190-B65D-4F22-98E4-050C045F9681}"/>
+              </a:ext>
+            </a:extLst>
+          </p:cNvPr>
+          <p:cNvPicPr>
+            <a:picLocks noChangeAspect="1"/>
+          </p:cNvPicPr>
+          <p:nvPr/>
+        </p:nvPicPr>
+        <p:blipFill>
+          <a:blip r:embed="rId5"/>
+          <a:stretch>
+            <a:fillRect/>
+          </a:stretch>
+        </p:blipFill>
+        <p:spPr>
+          <a:xfrm>
+            <a:off x="5842971" y="1458243"/>
+            <a:ext cx="5311975" cy="3390204"/>
+          </a:xfrm>
+          <a:prstGeom prst="rect">
+            <a:avLst/>
+          </a:prstGeom>
+        </p:spPr>
+      </p:pic>
+      <p:pic>
+        <p:nvPicPr>
+          <p:cNvPr id="15" name="Picture 14">
+            <a:extLst>
+              <a:ext uri="{FF2B5EF4-FFF2-40B4-BE49-F238E27FC236}">
+                <a16:creationId xmlns:a16="http://schemas.microsoft.com/office/drawing/2014/main" id="{1EE32A5C-228A-4682-831E-3F8D9AA35664}"/>
+              </a:ext>
+            </a:extLst>
+          </p:cNvPr>
+          <p:cNvPicPr>
+            <a:picLocks noChangeAspect="1"/>
+          </p:cNvPicPr>
+          <p:nvPr/>
+        </p:nvPicPr>
+        <p:blipFill>
+          <a:blip r:embed="rId6"/>
+          <a:stretch>
+            <a:fillRect/>
+          </a:stretch>
+        </p:blipFill>
+        <p:spPr>
+          <a:xfrm>
+            <a:off x="5901070" y="3650184"/>
+            <a:ext cx="4570671" cy="2991157"/>
+          </a:xfrm>
+          <a:prstGeom prst="rect">
+            <a:avLst/>
+          </a:prstGeom>
+        </p:spPr>
+      </p:pic>
     </p:spTree>
     <p:extLst>
       <p:ext uri="{BB962C8B-B14F-4D97-AF65-F5344CB8AC3E}">
-        <p14:creationId xmlns:p14="http://schemas.microsoft.com/office/powerpoint/2010/main" val="1332161596"/>
+        <p14:creationId xmlns:p14="http://schemas.microsoft.com/office/powerpoint/2010/main" val="2023850697"/>
       </p:ext>
     </p:extLst>
   </p:cSld>
@@ -4168,7 +4115,7 @@
         </p:nvSpPr>
         <p:spPr>
           <a:xfrm>
-            <a:off x="1988288" y="324439"/>
+            <a:off x="507743" y="218176"/>
             <a:ext cx="3912782" cy="643124"/>
           </a:xfrm>
         </p:spPr>
@@ -4183,17 +4130,17 @@
                 <a:latin typeface="Arial" panose="020B0604020202020204" pitchFamily="34" charset="0"/>
                 <a:cs typeface="Arial" panose="020B0604020202020204" pitchFamily="34" charset="0"/>
               </a:rPr>
-              <a:t>Results: All stocks</a:t>
+              <a:t>Results:11 stocks</a:t>
             </a:r>
           </a:p>
         </p:txBody>
       </p:sp>
       <p:pic>
         <p:nvPicPr>
-          <p:cNvPr id="3" name="Picture 2">
-            <a:extLst>
-              <a:ext uri="{FF2B5EF4-FFF2-40B4-BE49-F238E27FC236}">
-                <a16:creationId xmlns:a16="http://schemas.microsoft.com/office/drawing/2014/main" id="{0CAF7B1F-5D0F-49D6-A32D-14E75202F263}"/>
+          <p:cNvPr id="4" name="Picture 3">
+            <a:extLst>
+              <a:ext uri="{FF2B5EF4-FFF2-40B4-BE49-F238E27FC236}">
+                <a16:creationId xmlns:a16="http://schemas.microsoft.com/office/drawing/2014/main" id="{3A538CD7-EBAD-4779-9777-81577F54825E}"/>
               </a:ext>
             </a:extLst>
           </p:cNvPr>
@@ -4210,8 +4157,8 @@
         </p:blipFill>
         <p:spPr>
           <a:xfrm>
-            <a:off x="8934894" y="324439"/>
-            <a:ext cx="2824716" cy="1557321"/>
+            <a:off x="9197163" y="324440"/>
+            <a:ext cx="2590002" cy="1947298"/>
           </a:xfrm>
           <a:prstGeom prst="rect">
             <a:avLst/>
@@ -4220,10 +4167,10 @@
       </p:pic>
       <p:pic>
         <p:nvPicPr>
-          <p:cNvPr id="6" name="Picture 5">
-            <a:extLst>
-              <a:ext uri="{FF2B5EF4-FFF2-40B4-BE49-F238E27FC236}">
-                <a16:creationId xmlns:a16="http://schemas.microsoft.com/office/drawing/2014/main" id="{4C81E6F6-744D-4017-B411-4B7EB5B5D00E}"/>
+          <p:cNvPr id="8" name="Picture 7">
+            <a:extLst>
+              <a:ext uri="{FF2B5EF4-FFF2-40B4-BE49-F238E27FC236}">
+                <a16:creationId xmlns:a16="http://schemas.microsoft.com/office/drawing/2014/main" id="{F73A4D6B-FE54-4653-823D-F12F4C9682C3}"/>
               </a:ext>
             </a:extLst>
           </p:cNvPr>
@@ -4240,8 +4187,8 @@
         </p:blipFill>
         <p:spPr>
           <a:xfrm>
-            <a:off x="432390" y="967563"/>
-            <a:ext cx="4570671" cy="2097301"/>
+            <a:off x="5366084" y="324439"/>
+            <a:ext cx="3912782" cy="588899"/>
           </a:xfrm>
           <a:prstGeom prst="rect">
             <a:avLst/>
@@ -4250,10 +4197,10 @@
       </p:pic>
       <p:pic>
         <p:nvPicPr>
-          <p:cNvPr id="11" name="Picture 10">
-            <a:extLst>
-              <a:ext uri="{FF2B5EF4-FFF2-40B4-BE49-F238E27FC236}">
-                <a16:creationId xmlns:a16="http://schemas.microsoft.com/office/drawing/2014/main" id="{5987EBEC-FB14-4756-99AE-281559BE49D4}"/>
+          <p:cNvPr id="10" name="Picture 9">
+            <a:extLst>
+              <a:ext uri="{FF2B5EF4-FFF2-40B4-BE49-F238E27FC236}">
+                <a16:creationId xmlns:a16="http://schemas.microsoft.com/office/drawing/2014/main" id="{40D70BAE-9602-44F9-89C8-C799CA9C4B22}"/>
               </a:ext>
             </a:extLst>
           </p:cNvPr>
@@ -4262,15 +4209,16 @@
           </p:cNvPicPr>
           <p:nvPr/>
         </p:nvPicPr>
-        <p:blipFill rotWithShape="1">
+        <p:blipFill>
           <a:blip r:embed="rId4"/>
-          <a:srcRect r="2340"/>
-          <a:stretch/>
+          <a:stretch>
+            <a:fillRect/>
+          </a:stretch>
         </p:blipFill>
         <p:spPr>
           <a:xfrm>
-            <a:off x="310923" y="3435288"/>
-            <a:ext cx="5154212" cy="3098273"/>
+            <a:off x="156295" y="1034733"/>
+            <a:ext cx="4615678" cy="1993542"/>
           </a:xfrm>
           <a:prstGeom prst="rect">
             <a:avLst/>
@@ -4279,10 +4227,10 @@
       </p:pic>
       <p:pic>
         <p:nvPicPr>
-          <p:cNvPr id="13" name="Picture 12">
-            <a:extLst>
-              <a:ext uri="{FF2B5EF4-FFF2-40B4-BE49-F238E27FC236}">
-                <a16:creationId xmlns:a16="http://schemas.microsoft.com/office/drawing/2014/main" id="{C5696190-B65D-4F22-98E4-050C045F9681}"/>
+          <p:cNvPr id="14" name="Picture 13">
+            <a:extLst>
+              <a:ext uri="{FF2B5EF4-FFF2-40B4-BE49-F238E27FC236}">
+                <a16:creationId xmlns:a16="http://schemas.microsoft.com/office/drawing/2014/main" id="{07187821-C2BA-4B30-8D71-45AAA5F41E10}"/>
               </a:ext>
             </a:extLst>
           </p:cNvPr>
@@ -4299,8 +4247,8 @@
         </p:blipFill>
         <p:spPr>
           <a:xfrm>
-            <a:off x="5842971" y="1458243"/>
-            <a:ext cx="5311975" cy="3390204"/>
+            <a:off x="580177" y="3375142"/>
+            <a:ext cx="4615677" cy="2844905"/>
           </a:xfrm>
           <a:prstGeom prst="rect">
             <a:avLst/>
@@ -4309,10 +4257,10 @@
       </p:pic>
       <p:pic>
         <p:nvPicPr>
-          <p:cNvPr id="15" name="Picture 14">
-            <a:extLst>
-              <a:ext uri="{FF2B5EF4-FFF2-40B4-BE49-F238E27FC236}">
-                <a16:creationId xmlns:a16="http://schemas.microsoft.com/office/drawing/2014/main" id="{1EE32A5C-228A-4682-831E-3F8D9AA35664}"/>
+          <p:cNvPr id="17" name="Picture 16">
+            <a:extLst>
+              <a:ext uri="{FF2B5EF4-FFF2-40B4-BE49-F238E27FC236}">
+                <a16:creationId xmlns:a16="http://schemas.microsoft.com/office/drawing/2014/main" id="{2701BF2B-6E7D-4A6B-ABB1-0D707168B7DA}"/>
               </a:ext>
             </a:extLst>
           </p:cNvPr>
@@ -4329,8 +4277,38 @@
         </p:blipFill>
         <p:spPr>
           <a:xfrm>
-            <a:off x="5901070" y="3650184"/>
-            <a:ext cx="4570671" cy="2991157"/>
+            <a:off x="5282024" y="1053071"/>
+            <a:ext cx="2568894" cy="1218667"/>
+          </a:xfrm>
+          <a:prstGeom prst="rect">
+            <a:avLst/>
+          </a:prstGeom>
+        </p:spPr>
+      </p:pic>
+      <p:pic>
+        <p:nvPicPr>
+          <p:cNvPr id="19" name="Picture 18">
+            <a:extLst>
+              <a:ext uri="{FF2B5EF4-FFF2-40B4-BE49-F238E27FC236}">
+                <a16:creationId xmlns:a16="http://schemas.microsoft.com/office/drawing/2014/main" id="{E1ABD612-F625-4199-96E5-E1D87646096C}"/>
+              </a:ext>
+            </a:extLst>
+          </p:cNvPr>
+          <p:cNvPicPr>
+            <a:picLocks noChangeAspect="1"/>
+          </p:cNvPicPr>
+          <p:nvPr/>
+        </p:nvPicPr>
+        <p:blipFill>
+          <a:blip r:embed="rId7"/>
+          <a:stretch>
+            <a:fillRect/>
+          </a:stretch>
+        </p:blipFill>
+        <p:spPr>
+          <a:xfrm>
+            <a:off x="6542225" y="2874717"/>
+            <a:ext cx="5059338" cy="3423092"/>
           </a:xfrm>
           <a:prstGeom prst="rect">
             <a:avLst/>
@@ -4340,7 +4318,7 @@
     </p:spTree>
     <p:extLst>
       <p:ext uri="{BB962C8B-B14F-4D97-AF65-F5344CB8AC3E}">
-        <p14:creationId xmlns:p14="http://schemas.microsoft.com/office/powerpoint/2010/main" val="2023850697"/>
+        <p14:creationId xmlns:p14="http://schemas.microsoft.com/office/powerpoint/2010/main" val="374924178"/>
       </p:ext>
     </p:extLst>
   </p:cSld>

</xml_diff>